<commit_message>
some progress on interview presentation
</commit_message>
<xml_diff>
--- a/loan_fast_approval_slides_gm.pptx
+++ b/loan_fast_approval_slides_gm.pptx
@@ -4,6 +4,9 @@
   <p:sldMasterIdLst>
     <p:sldMasterId id="2147483660" r:id="rId4"/>
   </p:sldMasterIdLst>
+  <p:notesMasterIdLst>
+    <p:notesMasterId r:id="rId9"/>
+  </p:notesMasterIdLst>
   <p:sldIdLst>
     <p:sldId id="292" r:id="rId5"/>
     <p:sldId id="310" r:id="rId6"/>
@@ -113,6 +116,885 @@
     </p:ext>
   </p:extLst>
 </p:presentation>
+</file>
+
+<file path=ppt/notesMasters/notesMaster1.xml><?xml version="1.0" encoding="utf-8"?>
+<p:notesMaster xmlns:a="http://schemas.openxmlformats.org/drawingml/2006/main" xmlns:r="http://schemas.openxmlformats.org/officeDocument/2006/relationships" xmlns:p="http://schemas.openxmlformats.org/presentationml/2006/main">
+  <p:cSld>
+    <p:bg>
+      <p:bgRef idx="1001">
+        <a:schemeClr val="bg1"/>
+      </p:bgRef>
+    </p:bg>
+    <p:spTree>
+      <p:nvGrpSpPr>
+        <p:cNvPr id="1" name=""/>
+        <p:cNvGrpSpPr/>
+        <p:nvPr/>
+      </p:nvGrpSpPr>
+      <p:grpSpPr>
+        <a:xfrm>
+          <a:off x="0" y="0"/>
+          <a:ext cx="0" cy="0"/>
+          <a:chOff x="0" y="0"/>
+          <a:chExt cx="0" cy="0"/>
+        </a:xfrm>
+      </p:grpSpPr>
+      <p:sp>
+        <p:nvSpPr>
+          <p:cNvPr id="2" name="Header Placeholder 1"/>
+          <p:cNvSpPr>
+            <a:spLocks noGrp="1"/>
+          </p:cNvSpPr>
+          <p:nvPr>
+            <p:ph type="hdr" sz="quarter"/>
+          </p:nvPr>
+        </p:nvSpPr>
+        <p:spPr>
+          <a:xfrm>
+            <a:off x="0" y="0"/>
+            <a:ext cx="2971800" cy="458788"/>
+          </a:xfrm>
+          <a:prstGeom prst="rect">
+            <a:avLst/>
+          </a:prstGeom>
+        </p:spPr>
+        <p:txBody>
+          <a:bodyPr vert="horz" lIns="91440" tIns="45720" rIns="91440" bIns="45720" rtlCol="0"/>
+          <a:lstStyle>
+            <a:lvl1pPr algn="l">
+              <a:defRPr sz="1200"/>
+            </a:lvl1pPr>
+          </a:lstStyle>
+          <a:p>
+            <a:endParaRPr lang="en-US"/>
+          </a:p>
+        </p:txBody>
+      </p:sp>
+      <p:sp>
+        <p:nvSpPr>
+          <p:cNvPr id="3" name="Date Placeholder 2"/>
+          <p:cNvSpPr>
+            <a:spLocks noGrp="1"/>
+          </p:cNvSpPr>
+          <p:nvPr>
+            <p:ph type="dt" idx="1"/>
+          </p:nvPr>
+        </p:nvSpPr>
+        <p:spPr>
+          <a:xfrm>
+            <a:off x="3884613" y="0"/>
+            <a:ext cx="2971800" cy="458788"/>
+          </a:xfrm>
+          <a:prstGeom prst="rect">
+            <a:avLst/>
+          </a:prstGeom>
+        </p:spPr>
+        <p:txBody>
+          <a:bodyPr vert="horz" lIns="91440" tIns="45720" rIns="91440" bIns="45720" rtlCol="0"/>
+          <a:lstStyle>
+            <a:lvl1pPr algn="r">
+              <a:defRPr sz="1200"/>
+            </a:lvl1pPr>
+          </a:lstStyle>
+          <a:p>
+            <a:fld id="{B453364B-3CC6-420C-914F-8D0D78650FDD}" type="datetimeFigureOut">
+              <a:rPr lang="en-US" smtClean="0"/>
+              <a:t>11/15/2022</a:t>
+            </a:fld>
+            <a:endParaRPr lang="en-US"/>
+          </a:p>
+        </p:txBody>
+      </p:sp>
+      <p:sp>
+        <p:nvSpPr>
+          <p:cNvPr id="4" name="Slide Image Placeholder 3"/>
+          <p:cNvSpPr>
+            <a:spLocks noGrp="1" noRot="1" noChangeAspect="1"/>
+          </p:cNvSpPr>
+          <p:nvPr>
+            <p:ph type="sldImg" idx="2"/>
+          </p:nvPr>
+        </p:nvSpPr>
+        <p:spPr>
+          <a:xfrm>
+            <a:off x="685800" y="1143000"/>
+            <a:ext cx="5486400" cy="3086100"/>
+          </a:xfrm>
+          <a:prstGeom prst="rect">
+            <a:avLst/>
+          </a:prstGeom>
+          <a:noFill/>
+          <a:ln w="12700">
+            <a:solidFill>
+              <a:prstClr val="black"/>
+            </a:solidFill>
+          </a:ln>
+        </p:spPr>
+        <p:txBody>
+          <a:bodyPr vert="horz" lIns="91440" tIns="45720" rIns="91440" bIns="45720" rtlCol="0" anchor="ctr"/>
+          <a:lstStyle/>
+          <a:p>
+            <a:endParaRPr lang="en-US"/>
+          </a:p>
+        </p:txBody>
+      </p:sp>
+      <p:sp>
+        <p:nvSpPr>
+          <p:cNvPr id="5" name="Notes Placeholder 4"/>
+          <p:cNvSpPr>
+            <a:spLocks noGrp="1"/>
+          </p:cNvSpPr>
+          <p:nvPr>
+            <p:ph type="body" sz="quarter" idx="3"/>
+          </p:nvPr>
+        </p:nvSpPr>
+        <p:spPr>
+          <a:xfrm>
+            <a:off x="685800" y="4400550"/>
+            <a:ext cx="5486400" cy="3600450"/>
+          </a:xfrm>
+          <a:prstGeom prst="rect">
+            <a:avLst/>
+          </a:prstGeom>
+        </p:spPr>
+        <p:txBody>
+          <a:bodyPr vert="horz" lIns="91440" tIns="45720" rIns="91440" bIns="45720" rtlCol="0"/>
+          <a:lstStyle/>
+          <a:p>
+            <a:pPr lvl="0"/>
+            <a:r>
+              <a:rPr lang="en-US"/>
+              <a:t>Click to edit Master text styles</a:t>
+            </a:r>
+          </a:p>
+          <a:p>
+            <a:pPr lvl="1"/>
+            <a:r>
+              <a:rPr lang="en-US"/>
+              <a:t>Second level</a:t>
+            </a:r>
+          </a:p>
+          <a:p>
+            <a:pPr lvl="2"/>
+            <a:r>
+              <a:rPr lang="en-US"/>
+              <a:t>Third level</a:t>
+            </a:r>
+          </a:p>
+          <a:p>
+            <a:pPr lvl="3"/>
+            <a:r>
+              <a:rPr lang="en-US"/>
+              <a:t>Fourth level</a:t>
+            </a:r>
+          </a:p>
+          <a:p>
+            <a:pPr lvl="4"/>
+            <a:r>
+              <a:rPr lang="en-US"/>
+              <a:t>Fifth level</a:t>
+            </a:r>
+          </a:p>
+        </p:txBody>
+      </p:sp>
+      <p:sp>
+        <p:nvSpPr>
+          <p:cNvPr id="6" name="Footer Placeholder 5"/>
+          <p:cNvSpPr>
+            <a:spLocks noGrp="1"/>
+          </p:cNvSpPr>
+          <p:nvPr>
+            <p:ph type="ftr" sz="quarter" idx="4"/>
+          </p:nvPr>
+        </p:nvSpPr>
+        <p:spPr>
+          <a:xfrm>
+            <a:off x="0" y="8685213"/>
+            <a:ext cx="2971800" cy="458787"/>
+          </a:xfrm>
+          <a:prstGeom prst="rect">
+            <a:avLst/>
+          </a:prstGeom>
+        </p:spPr>
+        <p:txBody>
+          <a:bodyPr vert="horz" lIns="91440" tIns="45720" rIns="91440" bIns="45720" rtlCol="0" anchor="b"/>
+          <a:lstStyle>
+            <a:lvl1pPr algn="l">
+              <a:defRPr sz="1200"/>
+            </a:lvl1pPr>
+          </a:lstStyle>
+          <a:p>
+            <a:endParaRPr lang="en-US"/>
+          </a:p>
+        </p:txBody>
+      </p:sp>
+      <p:sp>
+        <p:nvSpPr>
+          <p:cNvPr id="7" name="Slide Number Placeholder 6"/>
+          <p:cNvSpPr>
+            <a:spLocks noGrp="1"/>
+          </p:cNvSpPr>
+          <p:nvPr>
+            <p:ph type="sldNum" sz="quarter" idx="5"/>
+          </p:nvPr>
+        </p:nvSpPr>
+        <p:spPr>
+          <a:xfrm>
+            <a:off x="3884613" y="8685213"/>
+            <a:ext cx="2971800" cy="458787"/>
+          </a:xfrm>
+          <a:prstGeom prst="rect">
+            <a:avLst/>
+          </a:prstGeom>
+        </p:spPr>
+        <p:txBody>
+          <a:bodyPr vert="horz" lIns="91440" tIns="45720" rIns="91440" bIns="45720" rtlCol="0" anchor="b"/>
+          <a:lstStyle>
+            <a:lvl1pPr algn="r">
+              <a:defRPr sz="1200"/>
+            </a:lvl1pPr>
+          </a:lstStyle>
+          <a:p>
+            <a:fld id="{A9349D5A-AE2B-4070-B9A0-AC77A3253D37}" type="slidenum">
+              <a:rPr lang="en-US" smtClean="0"/>
+              <a:t>‹#›</a:t>
+            </a:fld>
+            <a:endParaRPr lang="en-US"/>
+          </a:p>
+        </p:txBody>
+      </p:sp>
+    </p:spTree>
+    <p:extLst>
+      <p:ext uri="{BB962C8B-B14F-4D97-AF65-F5344CB8AC3E}">
+        <p14:creationId xmlns:p14="http://schemas.microsoft.com/office/powerpoint/2010/main" val="1570539712"/>
+      </p:ext>
+    </p:extLst>
+  </p:cSld>
+  <p:clrMap bg1="lt1" tx1="dk1" bg2="lt2" tx2="dk2" accent1="accent1" accent2="accent2" accent3="accent3" accent4="accent4" accent5="accent5" accent6="accent6" hlink="hlink" folHlink="folHlink"/>
+  <p:notesStyle>
+    <a:lvl1pPr marL="0" algn="l" defTabSz="914400" rtl="0" eaLnBrk="1" latinLnBrk="0" hangingPunct="1">
+      <a:defRPr sz="1200" kern="1200">
+        <a:solidFill>
+          <a:schemeClr val="tx1"/>
+        </a:solidFill>
+        <a:latin typeface="+mn-lt"/>
+        <a:ea typeface="+mn-ea"/>
+        <a:cs typeface="+mn-cs"/>
+      </a:defRPr>
+    </a:lvl1pPr>
+    <a:lvl2pPr marL="457200" algn="l" defTabSz="914400" rtl="0" eaLnBrk="1" latinLnBrk="0" hangingPunct="1">
+      <a:defRPr sz="1200" kern="1200">
+        <a:solidFill>
+          <a:schemeClr val="tx1"/>
+        </a:solidFill>
+        <a:latin typeface="+mn-lt"/>
+        <a:ea typeface="+mn-ea"/>
+        <a:cs typeface="+mn-cs"/>
+      </a:defRPr>
+    </a:lvl2pPr>
+    <a:lvl3pPr marL="914400" algn="l" defTabSz="914400" rtl="0" eaLnBrk="1" latinLnBrk="0" hangingPunct="1">
+      <a:defRPr sz="1200" kern="1200">
+        <a:solidFill>
+          <a:schemeClr val="tx1"/>
+        </a:solidFill>
+        <a:latin typeface="+mn-lt"/>
+        <a:ea typeface="+mn-ea"/>
+        <a:cs typeface="+mn-cs"/>
+      </a:defRPr>
+    </a:lvl3pPr>
+    <a:lvl4pPr marL="1371600" algn="l" defTabSz="914400" rtl="0" eaLnBrk="1" latinLnBrk="0" hangingPunct="1">
+      <a:defRPr sz="1200" kern="1200">
+        <a:solidFill>
+          <a:schemeClr val="tx1"/>
+        </a:solidFill>
+        <a:latin typeface="+mn-lt"/>
+        <a:ea typeface="+mn-ea"/>
+        <a:cs typeface="+mn-cs"/>
+      </a:defRPr>
+    </a:lvl4pPr>
+    <a:lvl5pPr marL="1828800" algn="l" defTabSz="914400" rtl="0" eaLnBrk="1" latinLnBrk="0" hangingPunct="1">
+      <a:defRPr sz="1200" kern="1200">
+        <a:solidFill>
+          <a:schemeClr val="tx1"/>
+        </a:solidFill>
+        <a:latin typeface="+mn-lt"/>
+        <a:ea typeface="+mn-ea"/>
+        <a:cs typeface="+mn-cs"/>
+      </a:defRPr>
+    </a:lvl5pPr>
+    <a:lvl6pPr marL="2286000" algn="l" defTabSz="914400" rtl="0" eaLnBrk="1" latinLnBrk="0" hangingPunct="1">
+      <a:defRPr sz="1200" kern="1200">
+        <a:solidFill>
+          <a:schemeClr val="tx1"/>
+        </a:solidFill>
+        <a:latin typeface="+mn-lt"/>
+        <a:ea typeface="+mn-ea"/>
+        <a:cs typeface="+mn-cs"/>
+      </a:defRPr>
+    </a:lvl6pPr>
+    <a:lvl7pPr marL="2743200" algn="l" defTabSz="914400" rtl="0" eaLnBrk="1" latinLnBrk="0" hangingPunct="1">
+      <a:defRPr sz="1200" kern="1200">
+        <a:solidFill>
+          <a:schemeClr val="tx1"/>
+        </a:solidFill>
+        <a:latin typeface="+mn-lt"/>
+        <a:ea typeface="+mn-ea"/>
+        <a:cs typeface="+mn-cs"/>
+      </a:defRPr>
+    </a:lvl7pPr>
+    <a:lvl8pPr marL="3200400" algn="l" defTabSz="914400" rtl="0" eaLnBrk="1" latinLnBrk="0" hangingPunct="1">
+      <a:defRPr sz="1200" kern="1200">
+        <a:solidFill>
+          <a:schemeClr val="tx1"/>
+        </a:solidFill>
+        <a:latin typeface="+mn-lt"/>
+        <a:ea typeface="+mn-ea"/>
+        <a:cs typeface="+mn-cs"/>
+      </a:defRPr>
+    </a:lvl8pPr>
+    <a:lvl9pPr marL="3657600" algn="l" defTabSz="914400" rtl="0" eaLnBrk="1" latinLnBrk="0" hangingPunct="1">
+      <a:defRPr sz="1200" kern="1200">
+        <a:solidFill>
+          <a:schemeClr val="tx1"/>
+        </a:solidFill>
+        <a:latin typeface="+mn-lt"/>
+        <a:ea typeface="+mn-ea"/>
+        <a:cs typeface="+mn-cs"/>
+      </a:defRPr>
+    </a:lvl9pPr>
+  </p:notesStyle>
+</p:notesMaster>
+</file>
+
+<file path=ppt/notesSlides/notesSlide1.xml><?xml version="1.0" encoding="utf-8"?>
+<p:notes xmlns:a="http://schemas.openxmlformats.org/drawingml/2006/main" xmlns:r="http://schemas.openxmlformats.org/officeDocument/2006/relationships" xmlns:p="http://schemas.openxmlformats.org/presentationml/2006/main">
+  <p:cSld>
+    <p:spTree>
+      <p:nvGrpSpPr>
+        <p:cNvPr id="1" name=""/>
+        <p:cNvGrpSpPr/>
+        <p:nvPr/>
+      </p:nvGrpSpPr>
+      <p:grpSpPr>
+        <a:xfrm>
+          <a:off x="0" y="0"/>
+          <a:ext cx="0" cy="0"/>
+          <a:chOff x="0" y="0"/>
+          <a:chExt cx="0" cy="0"/>
+        </a:xfrm>
+      </p:grpSpPr>
+      <p:sp>
+        <p:nvSpPr>
+          <p:cNvPr id="2" name="Slide Image Placeholder 1"/>
+          <p:cNvSpPr>
+            <a:spLocks noGrp="1" noRot="1" noChangeAspect="1"/>
+          </p:cNvSpPr>
+          <p:nvPr>
+            <p:ph type="sldImg"/>
+          </p:nvPr>
+        </p:nvSpPr>
+        <p:spPr/>
+      </p:sp>
+      <p:sp>
+        <p:nvSpPr>
+          <p:cNvPr id="3" name="Notes Placeholder 2"/>
+          <p:cNvSpPr>
+            <a:spLocks noGrp="1"/>
+          </p:cNvSpPr>
+          <p:nvPr>
+            <p:ph type="body" idx="1"/>
+          </p:nvPr>
+        </p:nvSpPr>
+        <p:spPr/>
+        <p:txBody>
+          <a:bodyPr/>
+          <a:lstStyle/>
+          <a:p>
+            <a:r>
+              <a:rPr lang="en-US" dirty="0"/>
+              <a:t>Hello everyone. My name is Grant, and I’m representing the Consumer Financial Protection Bureau as the VP of Loan Regulation.</a:t>
+            </a:r>
+          </a:p>
+          <a:p>
+            <a:endParaRPr lang="en-US" dirty="0"/>
+          </a:p>
+          <a:p>
+            <a:r>
+              <a:rPr lang="en-US" dirty="0"/>
+              <a:t>We are here today to discuss the possibility of an automated solution for mortgage loan origination. First a little bit of background on the problem.</a:t>
+            </a:r>
+          </a:p>
+          <a:p>
+            <a:endParaRPr lang="en-US" dirty="0"/>
+          </a:p>
+          <a:p>
+            <a:r>
+              <a:rPr lang="en-US" dirty="0"/>
+              <a:t>In the state of Illinois, it takes on average 30.5 days to get a mortgage (from loan application to decision), which carries a cost of $13 billion annually to consumers and financial institutions. Therefore, an automated solution has the potential to be attractive for consumers, yourselves as the financial institutions who need to process the loans, and us as the regulator.</a:t>
+            </a:r>
+          </a:p>
+          <a:p>
+            <a:endParaRPr lang="en-US" dirty="0"/>
+          </a:p>
+          <a:p>
+            <a:r>
+              <a:rPr lang="en-US" dirty="0"/>
+              <a:t>For example, consumers would no longer need to wait a month for extremely important and life changing news about their loan. Cost savings of potentially 13 billion dollars a year would mean higher profits for banks, and some of that would trickle down to consumers as banks would have more breathing room to compete for loan applicants.</a:t>
+            </a:r>
+          </a:p>
+          <a:p>
+            <a:endParaRPr lang="en-US" dirty="0"/>
+          </a:p>
+          <a:p>
+            <a:r>
+              <a:rPr lang="en-US" dirty="0"/>
+              <a:t>As for us as the regulator, we also see the potential benefits for ourselves. As you all know, our agency is dedicated to making sure everyone is treated fairly by banks, lenders and other financial institutions. An automated solution has the potential to increase fairness by reducing the implicit and explicit bias that has historically and currently exists in the US Financial System.</a:t>
+            </a:r>
+          </a:p>
+          <a:p>
+            <a:endParaRPr lang="en-US" dirty="0"/>
+          </a:p>
+          <a:p>
+            <a:r>
+              <a:rPr lang="en-US" dirty="0"/>
+              <a:t>However, there is a reason it takes over 30 days for a loan to be processed. A loan decision has the potential to massively alter the trajectory of an entire family's future. The remainder of todays discussion will focus on two equally important questions:</a:t>
+            </a:r>
+          </a:p>
+          <a:p>
+            <a:endParaRPr lang="en-US" dirty="0"/>
+          </a:p>
+          <a:p>
+            <a:r>
+              <a:rPr lang="en-US" dirty="0"/>
+              <a:t>1. Is an automated machine learning approach to loan origination possible?</a:t>
+            </a:r>
+          </a:p>
+          <a:p>
+            <a:endParaRPr lang="en-US" dirty="0"/>
+          </a:p>
+          <a:p>
+            <a:r>
+              <a:rPr lang="en-US" dirty="0"/>
+              <a:t>2. Is it the right thing to do?</a:t>
+            </a:r>
+          </a:p>
+        </p:txBody>
+      </p:sp>
+      <p:sp>
+        <p:nvSpPr>
+          <p:cNvPr id="4" name="Slide Number Placeholder 3"/>
+          <p:cNvSpPr>
+            <a:spLocks noGrp="1"/>
+          </p:cNvSpPr>
+          <p:nvPr>
+            <p:ph type="sldNum" sz="quarter" idx="5"/>
+          </p:nvPr>
+        </p:nvSpPr>
+        <p:spPr/>
+        <p:txBody>
+          <a:bodyPr/>
+          <a:lstStyle/>
+          <a:p>
+            <a:fld id="{A9349D5A-AE2B-4070-B9A0-AC77A3253D37}" type="slidenum">
+              <a:rPr lang="en-US" smtClean="0"/>
+              <a:t>1</a:t>
+            </a:fld>
+            <a:endParaRPr lang="en-US"/>
+          </a:p>
+        </p:txBody>
+      </p:sp>
+    </p:spTree>
+    <p:extLst>
+      <p:ext uri="{BB962C8B-B14F-4D97-AF65-F5344CB8AC3E}">
+        <p14:creationId xmlns:p14="http://schemas.microsoft.com/office/powerpoint/2010/main" val="3314559369"/>
+      </p:ext>
+    </p:extLst>
+  </p:cSld>
+  <p:clrMapOvr>
+    <a:masterClrMapping/>
+  </p:clrMapOvr>
+</p:notes>
+</file>
+
+<file path=ppt/notesSlides/notesSlide2.xml><?xml version="1.0" encoding="utf-8"?>
+<p:notes xmlns:a="http://schemas.openxmlformats.org/drawingml/2006/main" xmlns:r="http://schemas.openxmlformats.org/officeDocument/2006/relationships" xmlns:p="http://schemas.openxmlformats.org/presentationml/2006/main">
+  <p:cSld>
+    <p:spTree>
+      <p:nvGrpSpPr>
+        <p:cNvPr id="1" name=""/>
+        <p:cNvGrpSpPr/>
+        <p:nvPr/>
+      </p:nvGrpSpPr>
+      <p:grpSpPr>
+        <a:xfrm>
+          <a:off x="0" y="0"/>
+          <a:ext cx="0" cy="0"/>
+          <a:chOff x="0" y="0"/>
+          <a:chExt cx="0" cy="0"/>
+        </a:xfrm>
+      </p:grpSpPr>
+      <p:sp>
+        <p:nvSpPr>
+          <p:cNvPr id="2" name="Slide Image Placeholder 1"/>
+          <p:cNvSpPr>
+            <a:spLocks noGrp="1" noRot="1" noChangeAspect="1"/>
+          </p:cNvSpPr>
+          <p:nvPr>
+            <p:ph type="sldImg"/>
+          </p:nvPr>
+        </p:nvSpPr>
+        <p:spPr/>
+      </p:sp>
+      <p:sp>
+        <p:nvSpPr>
+          <p:cNvPr id="3" name="Notes Placeholder 2"/>
+          <p:cNvSpPr>
+            <a:spLocks noGrp="1"/>
+          </p:cNvSpPr>
+          <p:nvPr>
+            <p:ph type="body" idx="1"/>
+          </p:nvPr>
+        </p:nvSpPr>
+        <p:spPr/>
+        <p:txBody>
+          <a:bodyPr/>
+          <a:lstStyle/>
+          <a:p>
+            <a:r>
+              <a:rPr lang="en-US" dirty="0"/>
+              <a:t>Based on internal work done by our data scientists, a ML model can be used to predict loan approvals with a very high level of accuracy, and other model evaluation metrics indicate that we are off to a good start. There are two reasons why a model appears to work well.</a:t>
+            </a:r>
+          </a:p>
+          <a:p>
+            <a:endParaRPr lang="en-US" dirty="0"/>
+          </a:p>
+          <a:p>
+            <a:pPr marL="228600" indent="-228600">
+              <a:buAutoNum type="arabicPeriod"/>
+            </a:pPr>
+            <a:r>
+              <a:rPr lang="en-US" dirty="0"/>
+              <a:t>This problem is well suited for a model. You have a very clear independent variable, and dependent variables that are intuitively related to that independent variable. These are ideal conditions for a statistical model.</a:t>
+            </a:r>
+          </a:p>
+          <a:p>
+            <a:pPr marL="228600" indent="-228600">
+              <a:buAutoNum type="arabicPeriod"/>
+            </a:pPr>
+            <a:r>
+              <a:rPr lang="en-US" dirty="0"/>
+              <a:t>There is a huge amount of data. A lot of data is both a blessing and a curse. Having a lot of loans in the dataset is great, but having 50+ factors (income, loan amount, </a:t>
+            </a:r>
+            <a:r>
+              <a:rPr lang="en-US" dirty="0" err="1"/>
+              <a:t>etc</a:t>
+            </a:r>
+            <a:r>
+              <a:rPr lang="en-US" dirty="0"/>
+              <a:t>) that need to be considered prior to loan origination is a challenge obviously for human loan officers, but also machine learning models. Our internal data scientists have said that the huge number of dependent variables is the largest challenge to creating a production model, however I’ve been assured that our data scientists have used the correct statistical methods to deal with this issue.</a:t>
+            </a:r>
+          </a:p>
+          <a:p>
+            <a:pPr marL="228600" indent="-228600">
+              <a:buAutoNum type="arabicPeriod"/>
+            </a:pPr>
+            <a:endParaRPr lang="en-US" dirty="0"/>
+          </a:p>
+          <a:p>
+            <a:pPr marL="0" indent="0">
+              <a:buNone/>
+            </a:pPr>
+            <a:endParaRPr lang="en-US" dirty="0"/>
+          </a:p>
+          <a:p>
+            <a:endParaRPr lang="en-US" dirty="0"/>
+          </a:p>
+          <a:p>
+            <a:endParaRPr lang="en-US" dirty="0"/>
+          </a:p>
+          <a:p>
+            <a:endParaRPr lang="en-US" dirty="0"/>
+          </a:p>
+        </p:txBody>
+      </p:sp>
+      <p:sp>
+        <p:nvSpPr>
+          <p:cNvPr id="4" name="Slide Number Placeholder 3"/>
+          <p:cNvSpPr>
+            <a:spLocks noGrp="1"/>
+          </p:cNvSpPr>
+          <p:nvPr>
+            <p:ph type="sldNum" sz="quarter" idx="5"/>
+          </p:nvPr>
+        </p:nvSpPr>
+        <p:spPr/>
+        <p:txBody>
+          <a:bodyPr/>
+          <a:lstStyle/>
+          <a:p>
+            <a:fld id="{A9349D5A-AE2B-4070-B9A0-AC77A3253D37}" type="slidenum">
+              <a:rPr lang="en-US" smtClean="0"/>
+              <a:t>2</a:t>
+            </a:fld>
+            <a:endParaRPr lang="en-US"/>
+          </a:p>
+        </p:txBody>
+      </p:sp>
+    </p:spTree>
+    <p:extLst>
+      <p:ext uri="{BB962C8B-B14F-4D97-AF65-F5344CB8AC3E}">
+        <p14:creationId xmlns:p14="http://schemas.microsoft.com/office/powerpoint/2010/main" val="3074037331"/>
+      </p:ext>
+    </p:extLst>
+  </p:cSld>
+  <p:clrMapOvr>
+    <a:masterClrMapping/>
+  </p:clrMapOvr>
+</p:notes>
+</file>
+
+<file path=ppt/notesSlides/notesSlide3.xml><?xml version="1.0" encoding="utf-8"?>
+<p:notes xmlns:a="http://schemas.openxmlformats.org/drawingml/2006/main" xmlns:r="http://schemas.openxmlformats.org/officeDocument/2006/relationships" xmlns:p="http://schemas.openxmlformats.org/presentationml/2006/main">
+  <p:cSld>
+    <p:spTree>
+      <p:nvGrpSpPr>
+        <p:cNvPr id="1" name=""/>
+        <p:cNvGrpSpPr/>
+        <p:nvPr/>
+      </p:nvGrpSpPr>
+      <p:grpSpPr>
+        <a:xfrm>
+          <a:off x="0" y="0"/>
+          <a:ext cx="0" cy="0"/>
+          <a:chOff x="0" y="0"/>
+          <a:chExt cx="0" cy="0"/>
+        </a:xfrm>
+      </p:grpSpPr>
+      <p:sp>
+        <p:nvSpPr>
+          <p:cNvPr id="2" name="Slide Image Placeholder 1"/>
+          <p:cNvSpPr>
+            <a:spLocks noGrp="1" noRot="1" noChangeAspect="1"/>
+          </p:cNvSpPr>
+          <p:nvPr>
+            <p:ph type="sldImg"/>
+          </p:nvPr>
+        </p:nvSpPr>
+        <p:spPr/>
+      </p:sp>
+      <p:sp>
+        <p:nvSpPr>
+          <p:cNvPr id="3" name="Notes Placeholder 2"/>
+          <p:cNvSpPr>
+            <a:spLocks noGrp="1"/>
+          </p:cNvSpPr>
+          <p:nvPr>
+            <p:ph type="body" idx="1"/>
+          </p:nvPr>
+        </p:nvSpPr>
+        <p:spPr/>
+        <p:txBody>
+          <a:bodyPr/>
+          <a:lstStyle/>
+          <a:p>
+            <a:r>
+              <a:rPr lang="en-US" dirty="0"/>
+              <a:t>While these preliminary results are encouraging, lets put things in perspective. </a:t>
+            </a:r>
+          </a:p>
+          <a:p>
+            <a:pPr marL="0" marR="0" lvl="0" indent="0" algn="l" defTabSz="914400" rtl="0" eaLnBrk="1" fontAlgn="auto" latinLnBrk="0" hangingPunct="1">
+              <a:lnSpc>
+                <a:spcPct val="100000"/>
+              </a:lnSpc>
+              <a:spcBef>
+                <a:spcPts val="0"/>
+              </a:spcBef>
+              <a:spcAft>
+                <a:spcPts val="0"/>
+              </a:spcAft>
+              <a:buClrTx/>
+              <a:buSzTx/>
+              <a:buFontTx/>
+              <a:buNone/>
+              <a:tabLst/>
+              <a:defRPr/>
+            </a:pPr>
+            <a:r>
+              <a:rPr lang="en-US" dirty="0"/>
+              <a:t>Mortgage lenders issued 2.71 million residential loans in the first three months of 2022 across the US. A model that is 99% accurate would have made the incorrect loan decision 27 thousand times. That means that 27 thousand people and their families would either be given a loan that they can't afford (default, eviction), or qualified applicants would be rejected, and their dream of home ownership and financial independence could be irreversibly damaged. </a:t>
+            </a:r>
+          </a:p>
+          <a:p>
+            <a:pPr marL="0" marR="0" lvl="0" indent="0" algn="l" defTabSz="914400" rtl="0" eaLnBrk="1" fontAlgn="auto" latinLnBrk="0" hangingPunct="1">
+              <a:lnSpc>
+                <a:spcPct val="100000"/>
+              </a:lnSpc>
+              <a:spcBef>
+                <a:spcPts val="0"/>
+              </a:spcBef>
+              <a:spcAft>
+                <a:spcPts val="0"/>
+              </a:spcAft>
+              <a:buClrTx/>
+              <a:buSzTx/>
+              <a:buFontTx/>
+              <a:buNone/>
+              <a:tabLst/>
+              <a:defRPr/>
+            </a:pPr>
+            <a:endParaRPr lang="en-US" dirty="0"/>
+          </a:p>
+          <a:p>
+            <a:pPr marL="0" marR="0" lvl="0" indent="0" algn="l" defTabSz="914400" rtl="0" eaLnBrk="1" fontAlgn="auto" latinLnBrk="0" hangingPunct="1">
+              <a:lnSpc>
+                <a:spcPct val="100000"/>
+              </a:lnSpc>
+              <a:spcBef>
+                <a:spcPts val="0"/>
+              </a:spcBef>
+              <a:spcAft>
+                <a:spcPts val="0"/>
+              </a:spcAft>
+              <a:buClrTx/>
+              <a:buSzTx/>
+              <a:buFontTx/>
+              <a:buNone/>
+              <a:tabLst/>
+              <a:defRPr/>
+            </a:pPr>
+            <a:r>
+              <a:rPr lang="en-US" dirty="0"/>
+              <a:t>These 27 thousand errors are in addition to the fact that the model is bult on top of loan decision made by humans. The model can only ever perform as well, but not better than a human loan officers' judgement. </a:t>
+            </a:r>
+          </a:p>
+          <a:p>
+            <a:endParaRPr lang="en-US" dirty="0"/>
+          </a:p>
+          <a:p>
+            <a:endParaRPr lang="en-US" dirty="0"/>
+          </a:p>
+        </p:txBody>
+      </p:sp>
+      <p:sp>
+        <p:nvSpPr>
+          <p:cNvPr id="4" name="Slide Number Placeholder 3"/>
+          <p:cNvSpPr>
+            <a:spLocks noGrp="1"/>
+          </p:cNvSpPr>
+          <p:nvPr>
+            <p:ph type="sldNum" sz="quarter" idx="5"/>
+          </p:nvPr>
+        </p:nvSpPr>
+        <p:spPr/>
+        <p:txBody>
+          <a:bodyPr/>
+          <a:lstStyle/>
+          <a:p>
+            <a:fld id="{A9349D5A-AE2B-4070-B9A0-AC77A3253D37}" type="slidenum">
+              <a:rPr lang="en-US" smtClean="0"/>
+              <a:t>3</a:t>
+            </a:fld>
+            <a:endParaRPr lang="en-US"/>
+          </a:p>
+        </p:txBody>
+      </p:sp>
+    </p:spTree>
+    <p:extLst>
+      <p:ext uri="{BB962C8B-B14F-4D97-AF65-F5344CB8AC3E}">
+        <p14:creationId xmlns:p14="http://schemas.microsoft.com/office/powerpoint/2010/main" val="3664176239"/>
+      </p:ext>
+    </p:extLst>
+  </p:cSld>
+  <p:clrMapOvr>
+    <a:masterClrMapping/>
+  </p:clrMapOvr>
+</p:notes>
+</file>
+
+<file path=ppt/notesSlides/notesSlide4.xml><?xml version="1.0" encoding="utf-8"?>
+<p:notes xmlns:a="http://schemas.openxmlformats.org/drawingml/2006/main" xmlns:r="http://schemas.openxmlformats.org/officeDocument/2006/relationships" xmlns:p="http://schemas.openxmlformats.org/presentationml/2006/main">
+  <p:cSld>
+    <p:spTree>
+      <p:nvGrpSpPr>
+        <p:cNvPr id="1" name=""/>
+        <p:cNvGrpSpPr/>
+        <p:nvPr/>
+      </p:nvGrpSpPr>
+      <p:grpSpPr>
+        <a:xfrm>
+          <a:off x="0" y="0"/>
+          <a:ext cx="0" cy="0"/>
+          <a:chOff x="0" y="0"/>
+          <a:chExt cx="0" cy="0"/>
+        </a:xfrm>
+      </p:grpSpPr>
+      <p:sp>
+        <p:nvSpPr>
+          <p:cNvPr id="2" name="Slide Image Placeholder 1"/>
+          <p:cNvSpPr>
+            <a:spLocks noGrp="1" noRot="1" noChangeAspect="1"/>
+          </p:cNvSpPr>
+          <p:nvPr>
+            <p:ph type="sldImg"/>
+          </p:nvPr>
+        </p:nvSpPr>
+        <p:spPr/>
+      </p:sp>
+      <p:sp>
+        <p:nvSpPr>
+          <p:cNvPr id="3" name="Notes Placeholder 2"/>
+          <p:cNvSpPr>
+            <a:spLocks noGrp="1"/>
+          </p:cNvSpPr>
+          <p:nvPr>
+            <p:ph type="body" idx="1"/>
+          </p:nvPr>
+        </p:nvSpPr>
+        <p:spPr/>
+        <p:txBody>
+          <a:bodyPr/>
+          <a:lstStyle/>
+          <a:p>
+            <a:endParaRPr lang="en-US" dirty="0"/>
+          </a:p>
+        </p:txBody>
+      </p:sp>
+      <p:sp>
+        <p:nvSpPr>
+          <p:cNvPr id="4" name="Slide Number Placeholder 3"/>
+          <p:cNvSpPr>
+            <a:spLocks noGrp="1"/>
+          </p:cNvSpPr>
+          <p:nvPr>
+            <p:ph type="sldNum" sz="quarter" idx="5"/>
+          </p:nvPr>
+        </p:nvSpPr>
+        <p:spPr/>
+        <p:txBody>
+          <a:bodyPr/>
+          <a:lstStyle/>
+          <a:p>
+            <a:fld id="{A9349D5A-AE2B-4070-B9A0-AC77A3253D37}" type="slidenum">
+              <a:rPr lang="en-US" smtClean="0"/>
+              <a:t>4</a:t>
+            </a:fld>
+            <a:endParaRPr lang="en-US"/>
+          </a:p>
+        </p:txBody>
+      </p:sp>
+    </p:spTree>
+    <p:extLst>
+      <p:ext uri="{BB962C8B-B14F-4D97-AF65-F5344CB8AC3E}">
+        <p14:creationId xmlns:p14="http://schemas.microsoft.com/office/powerpoint/2010/main" val="3106839365"/>
+      </p:ext>
+    </p:extLst>
+  </p:cSld>
+  <p:clrMapOvr>
+    <a:masterClrMapping/>
+  </p:clrMapOvr>
+</p:notes>
 </file>
 
 <file path=ppt/slideLayouts/slideLayout1.xml><?xml version="1.0" encoding="utf-8"?>
@@ -584,7 +1466,7 @@
           <a:p>
             <a:fld id="{EA0C0817-A112-4847-8014-A94B7D2A4EA3}" type="datetime1">
               <a:rPr lang="en-US" smtClean="0"/>
-              <a:t>10/10/2022</a:t>
+              <a:t>11/15/2022</a:t>
             </a:fld>
             <a:endParaRPr lang="en-US" dirty="0"/>
           </a:p>
@@ -786,7 +1668,7 @@
           <a:p>
             <a:fld id="{7332B432-ACDA-4023-A761-2BAB76577B62}" type="datetime1">
               <a:rPr lang="en-US" smtClean="0"/>
-              <a:t>10/10/2022</a:t>
+              <a:t>11/15/2022</a:t>
             </a:fld>
             <a:endParaRPr lang="en-US" dirty="0"/>
           </a:p>
@@ -1385,7 +2267,7 @@
           <a:p>
             <a:fld id="{D9C646AA-F36E-4540-911D-FFFC0A0EF24A}" type="datetime1">
               <a:rPr lang="en-US" smtClean="0"/>
-              <a:t>10/10/2022</a:t>
+              <a:t>11/15/2022</a:t>
             </a:fld>
             <a:endParaRPr lang="en-US" dirty="0"/>
           </a:p>
@@ -1705,7 +2587,7 @@
           <a:p>
             <a:fld id="{69186D26-FA5F-4637-B602-B7C2DC34CFD4}" type="datetime1">
               <a:rPr lang="en-US" smtClean="0"/>
-              <a:t>10/10/2022</a:t>
+              <a:t>11/15/2022</a:t>
             </a:fld>
             <a:endParaRPr lang="en-US" dirty="0"/>
           </a:p>
@@ -2142,7 +3024,7 @@
           <a:p>
             <a:fld id="{8A7F15D8-96D1-4781-BC50-CA8A088B2FE4}" type="datetime1">
               <a:rPr lang="en-US" smtClean="0"/>
-              <a:t>10/10/2022</a:t>
+              <a:t>11/15/2022</a:t>
             </a:fld>
             <a:endParaRPr lang="en-US" dirty="0"/>
           </a:p>
@@ -2260,7 +3142,7 @@
           <a:p>
             <a:fld id="{F9A96C99-B8F8-4528-BD05-0E16E943DC09}" type="datetime1">
               <a:rPr lang="en-US" smtClean="0"/>
-              <a:t>10/10/2022</a:t>
+              <a:t>11/15/2022</a:t>
             </a:fld>
             <a:endParaRPr lang="en-US" dirty="0"/>
           </a:p>
@@ -2355,7 +3237,7 @@
           <a:p>
             <a:fld id="{03636942-C211-4B28-8DBD-C953E00AF71B}" type="datetime1">
               <a:rPr lang="en-US" smtClean="0"/>
-              <a:t>10/10/2022</a:t>
+              <a:t>11/15/2022</a:t>
             </a:fld>
             <a:endParaRPr lang="en-US" dirty="0"/>
           </a:p>
@@ -2772,7 +3654,7 @@
           <a:p>
             <a:fld id="{7E8D12A6-918A-48BD-8CB9-CA713993B0EA}" type="datetime1">
               <a:rPr lang="en-US" smtClean="0"/>
-              <a:t>10/10/2022</a:t>
+              <a:t>11/15/2022</a:t>
             </a:fld>
             <a:endParaRPr lang="en-US" dirty="0"/>
           </a:p>
@@ -3034,7 +3916,7 @@
             <a:fld id="{E778CE86-875F-4587-BCF6-FA054AFC0D53}" type="datetime1">
               <a:rPr lang="en-US" smtClean="0"/>
               <a:pPr/>
-              <a:t>10/10/2022</a:t>
+              <a:t>11/15/2022</a:t>
             </a:fld>
             <a:endParaRPr lang="en-US" dirty="0"/>
           </a:p>
@@ -3550,7 +4432,7 @@
           <a:p>
             <a:fld id="{F6FA2B21-3FCD-4721-B95C-427943F61125}" type="datetime1">
               <a:rPr lang="en-US" smtClean="0"/>
-              <a:t>10/10/2022</a:t>
+              <a:t>11/15/2022</a:t>
             </a:fld>
             <a:endParaRPr lang="en-US" dirty="0"/>
           </a:p>
@@ -4043,7 +4925,7 @@
           <p:nvPr/>
         </p:nvPicPr>
         <p:blipFill rotWithShape="1">
-          <a:blip r:embed="rId3"/>
+          <a:blip r:embed="rId4"/>
           <a:srcRect t="3846"/>
           <a:stretch/>
         </p:blipFill>
@@ -4547,7 +5429,7 @@
             </a:r>
             <a:r>
               <a:rPr lang="en-US" dirty="0">
-                <a:hlinkClick r:id="rId2"/>
+                <a:hlinkClick r:id="rId3"/>
               </a:rPr>
               <a:t>violate these acts</a:t>
             </a:r>
@@ -4882,6 +5764,301 @@
 </a:theme>
 </file>
 
+<file path=ppt/theme/theme2.xml><?xml version="1.0" encoding="utf-8"?>
+<a:theme xmlns:a="http://schemas.openxmlformats.org/drawingml/2006/main" name="Office Theme">
+  <a:themeElements>
+    <a:clrScheme name="Office">
+      <a:dk1>
+        <a:sysClr val="windowText" lastClr="000000"/>
+      </a:dk1>
+      <a:lt1>
+        <a:sysClr val="window" lastClr="FFFFFF"/>
+      </a:lt1>
+      <a:dk2>
+        <a:srgbClr val="44546A"/>
+      </a:dk2>
+      <a:lt2>
+        <a:srgbClr val="E7E6E6"/>
+      </a:lt2>
+      <a:accent1>
+        <a:srgbClr val="4472C4"/>
+      </a:accent1>
+      <a:accent2>
+        <a:srgbClr val="ED7D31"/>
+      </a:accent2>
+      <a:accent3>
+        <a:srgbClr val="A5A5A5"/>
+      </a:accent3>
+      <a:accent4>
+        <a:srgbClr val="FFC000"/>
+      </a:accent4>
+      <a:accent5>
+        <a:srgbClr val="5B9BD5"/>
+      </a:accent5>
+      <a:accent6>
+        <a:srgbClr val="70AD47"/>
+      </a:accent6>
+      <a:hlink>
+        <a:srgbClr val="0563C1"/>
+      </a:hlink>
+      <a:folHlink>
+        <a:srgbClr val="954F72"/>
+      </a:folHlink>
+    </a:clrScheme>
+    <a:fontScheme name="Office">
+      <a:majorFont>
+        <a:latin typeface="Calibri Light" panose="020F0302020204030204"/>
+        <a:ea typeface=""/>
+        <a:cs typeface=""/>
+        <a:font script="Jpan" typeface="游ゴシック Light"/>
+        <a:font script="Hang" typeface="맑은 고딕"/>
+        <a:font script="Hans" typeface="等线 Light"/>
+        <a:font script="Hant" typeface="新細明體"/>
+        <a:font script="Arab" typeface="Times New Roman"/>
+        <a:font script="Hebr" typeface="Times New Roman"/>
+        <a:font script="Thai" typeface="Angsana New"/>
+        <a:font script="Ethi" typeface="Nyala"/>
+        <a:font script="Beng" typeface="Vrinda"/>
+        <a:font script="Gujr" typeface="Shruti"/>
+        <a:font script="Khmr" typeface="MoolBoran"/>
+        <a:font script="Knda" typeface="Tunga"/>
+        <a:font script="Guru" typeface="Raavi"/>
+        <a:font script="Cans" typeface="Euphemia"/>
+        <a:font script="Cher" typeface="Plantagenet Cherokee"/>
+        <a:font script="Yiii" typeface="Microsoft Yi Baiti"/>
+        <a:font script="Tibt" typeface="Microsoft Himalaya"/>
+        <a:font script="Thaa" typeface="MV Boli"/>
+        <a:font script="Deva" typeface="Mangal"/>
+        <a:font script="Telu" typeface="Gautami"/>
+        <a:font script="Taml" typeface="Latha"/>
+        <a:font script="Syrc" typeface="Estrangelo Edessa"/>
+        <a:font script="Orya" typeface="Kalinga"/>
+        <a:font script="Mlym" typeface="Kartika"/>
+        <a:font script="Laoo" typeface="DokChampa"/>
+        <a:font script="Sinh" typeface="Iskoola Pota"/>
+        <a:font script="Mong" typeface="Mongolian Baiti"/>
+        <a:font script="Viet" typeface="Times New Roman"/>
+        <a:font script="Uigh" typeface="Microsoft Uighur"/>
+        <a:font script="Geor" typeface="Sylfaen"/>
+        <a:font script="Armn" typeface="Arial"/>
+        <a:font script="Bugi" typeface="Leelawadee UI"/>
+        <a:font script="Bopo" typeface="Microsoft JhengHei"/>
+        <a:font script="Java" typeface="Javanese Text"/>
+        <a:font script="Lisu" typeface="Segoe UI"/>
+        <a:font script="Mymr" typeface="Myanmar Text"/>
+        <a:font script="Nkoo" typeface="Ebrima"/>
+        <a:font script="Olck" typeface="Nirmala UI"/>
+        <a:font script="Osma" typeface="Ebrima"/>
+        <a:font script="Phag" typeface="Phagspa"/>
+        <a:font script="Syrn" typeface="Estrangelo Edessa"/>
+        <a:font script="Syrj" typeface="Estrangelo Edessa"/>
+        <a:font script="Syre" typeface="Estrangelo Edessa"/>
+        <a:font script="Sora" typeface="Nirmala UI"/>
+        <a:font script="Tale" typeface="Microsoft Tai Le"/>
+        <a:font script="Talu" typeface="Microsoft New Tai Lue"/>
+        <a:font script="Tfng" typeface="Ebrima"/>
+      </a:majorFont>
+      <a:minorFont>
+        <a:latin typeface="Calibri" panose="020F0502020204030204"/>
+        <a:ea typeface=""/>
+        <a:cs typeface=""/>
+        <a:font script="Jpan" typeface="游ゴシック"/>
+        <a:font script="Hang" typeface="맑은 고딕"/>
+        <a:font script="Hans" typeface="等线"/>
+        <a:font script="Hant" typeface="新細明體"/>
+        <a:font script="Arab" typeface="Arial"/>
+        <a:font script="Hebr" typeface="Arial"/>
+        <a:font script="Thai" typeface="Cordia New"/>
+        <a:font script="Ethi" typeface="Nyala"/>
+        <a:font script="Beng" typeface="Vrinda"/>
+        <a:font script="Gujr" typeface="Shruti"/>
+        <a:font script="Khmr" typeface="DaunPenh"/>
+        <a:font script="Knda" typeface="Tunga"/>
+        <a:font script="Guru" typeface="Raavi"/>
+        <a:font script="Cans" typeface="Euphemia"/>
+        <a:font script="Cher" typeface="Plantagenet Cherokee"/>
+        <a:font script="Yiii" typeface="Microsoft Yi Baiti"/>
+        <a:font script="Tibt" typeface="Microsoft Himalaya"/>
+        <a:font script="Thaa" typeface="MV Boli"/>
+        <a:font script="Deva" typeface="Mangal"/>
+        <a:font script="Telu" typeface="Gautami"/>
+        <a:font script="Taml" typeface="Latha"/>
+        <a:font script="Syrc" typeface="Estrangelo Edessa"/>
+        <a:font script="Orya" typeface="Kalinga"/>
+        <a:font script="Mlym" typeface="Kartika"/>
+        <a:font script="Laoo" typeface="DokChampa"/>
+        <a:font script="Sinh" typeface="Iskoola Pota"/>
+        <a:font script="Mong" typeface="Mongolian Baiti"/>
+        <a:font script="Viet" typeface="Arial"/>
+        <a:font script="Uigh" typeface="Microsoft Uighur"/>
+        <a:font script="Geor" typeface="Sylfaen"/>
+        <a:font script="Armn" typeface="Arial"/>
+        <a:font script="Bugi" typeface="Leelawadee UI"/>
+        <a:font script="Bopo" typeface="Microsoft JhengHei"/>
+        <a:font script="Java" typeface="Javanese Text"/>
+        <a:font script="Lisu" typeface="Segoe UI"/>
+        <a:font script="Mymr" typeface="Myanmar Text"/>
+        <a:font script="Nkoo" typeface="Ebrima"/>
+        <a:font script="Olck" typeface="Nirmala UI"/>
+        <a:font script="Osma" typeface="Ebrima"/>
+        <a:font script="Phag" typeface="Phagspa"/>
+        <a:font script="Syrn" typeface="Estrangelo Edessa"/>
+        <a:font script="Syrj" typeface="Estrangelo Edessa"/>
+        <a:font script="Syre" typeface="Estrangelo Edessa"/>
+        <a:font script="Sora" typeface="Nirmala UI"/>
+        <a:font script="Tale" typeface="Microsoft Tai Le"/>
+        <a:font script="Talu" typeface="Microsoft New Tai Lue"/>
+        <a:font script="Tfng" typeface="Ebrima"/>
+      </a:minorFont>
+    </a:fontScheme>
+    <a:fmtScheme name="Office">
+      <a:fillStyleLst>
+        <a:solidFill>
+          <a:schemeClr val="phClr"/>
+        </a:solidFill>
+        <a:gradFill rotWithShape="1">
+          <a:gsLst>
+            <a:gs pos="0">
+              <a:schemeClr val="phClr">
+                <a:lumMod val="110000"/>
+                <a:satMod val="105000"/>
+                <a:tint val="67000"/>
+              </a:schemeClr>
+            </a:gs>
+            <a:gs pos="50000">
+              <a:schemeClr val="phClr">
+                <a:lumMod val="105000"/>
+                <a:satMod val="103000"/>
+                <a:tint val="73000"/>
+              </a:schemeClr>
+            </a:gs>
+            <a:gs pos="100000">
+              <a:schemeClr val="phClr">
+                <a:lumMod val="105000"/>
+                <a:satMod val="109000"/>
+                <a:tint val="81000"/>
+              </a:schemeClr>
+            </a:gs>
+          </a:gsLst>
+          <a:lin ang="5400000" scaled="0"/>
+        </a:gradFill>
+        <a:gradFill rotWithShape="1">
+          <a:gsLst>
+            <a:gs pos="0">
+              <a:schemeClr val="phClr">
+                <a:satMod val="103000"/>
+                <a:lumMod val="102000"/>
+                <a:tint val="94000"/>
+              </a:schemeClr>
+            </a:gs>
+            <a:gs pos="50000">
+              <a:schemeClr val="phClr">
+                <a:satMod val="110000"/>
+                <a:lumMod val="100000"/>
+                <a:shade val="100000"/>
+              </a:schemeClr>
+            </a:gs>
+            <a:gs pos="100000">
+              <a:schemeClr val="phClr">
+                <a:lumMod val="99000"/>
+                <a:satMod val="120000"/>
+                <a:shade val="78000"/>
+              </a:schemeClr>
+            </a:gs>
+          </a:gsLst>
+          <a:lin ang="5400000" scaled="0"/>
+        </a:gradFill>
+      </a:fillStyleLst>
+      <a:lnStyleLst>
+        <a:ln w="6350" cap="flat" cmpd="sng" algn="ctr">
+          <a:solidFill>
+            <a:schemeClr val="phClr"/>
+          </a:solidFill>
+          <a:prstDash val="solid"/>
+          <a:miter lim="800000"/>
+        </a:ln>
+        <a:ln w="12700" cap="flat" cmpd="sng" algn="ctr">
+          <a:solidFill>
+            <a:schemeClr val="phClr"/>
+          </a:solidFill>
+          <a:prstDash val="solid"/>
+          <a:miter lim="800000"/>
+        </a:ln>
+        <a:ln w="19050" cap="flat" cmpd="sng" algn="ctr">
+          <a:solidFill>
+            <a:schemeClr val="phClr"/>
+          </a:solidFill>
+          <a:prstDash val="solid"/>
+          <a:miter lim="800000"/>
+        </a:ln>
+      </a:lnStyleLst>
+      <a:effectStyleLst>
+        <a:effectStyle>
+          <a:effectLst/>
+        </a:effectStyle>
+        <a:effectStyle>
+          <a:effectLst/>
+        </a:effectStyle>
+        <a:effectStyle>
+          <a:effectLst>
+            <a:outerShdw blurRad="57150" dist="19050" dir="5400000" algn="ctr" rotWithShape="0">
+              <a:srgbClr val="000000">
+                <a:alpha val="63000"/>
+              </a:srgbClr>
+            </a:outerShdw>
+          </a:effectLst>
+        </a:effectStyle>
+      </a:effectStyleLst>
+      <a:bgFillStyleLst>
+        <a:solidFill>
+          <a:schemeClr val="phClr"/>
+        </a:solidFill>
+        <a:solidFill>
+          <a:schemeClr val="phClr">
+            <a:tint val="95000"/>
+            <a:satMod val="170000"/>
+          </a:schemeClr>
+        </a:solidFill>
+        <a:gradFill rotWithShape="1">
+          <a:gsLst>
+            <a:gs pos="0">
+              <a:schemeClr val="phClr">
+                <a:tint val="93000"/>
+                <a:satMod val="150000"/>
+                <a:shade val="98000"/>
+                <a:lumMod val="102000"/>
+              </a:schemeClr>
+            </a:gs>
+            <a:gs pos="50000">
+              <a:schemeClr val="phClr">
+                <a:tint val="98000"/>
+                <a:satMod val="130000"/>
+                <a:shade val="90000"/>
+                <a:lumMod val="103000"/>
+              </a:schemeClr>
+            </a:gs>
+            <a:gs pos="100000">
+              <a:schemeClr val="phClr">
+                <a:shade val="63000"/>
+                <a:satMod val="120000"/>
+              </a:schemeClr>
+            </a:gs>
+          </a:gsLst>
+          <a:lin ang="5400000" scaled="0"/>
+        </a:gradFill>
+      </a:bgFillStyleLst>
+    </a:fmtScheme>
+  </a:themeElements>
+  <a:objectDefaults/>
+  <a:extraClrSchemeLst/>
+  <a:extLst>
+    <a:ext uri="{05A4C25C-085E-4340-85A3-A5531E510DB2}">
+      <thm15:themeFamily xmlns:thm15="http://schemas.microsoft.com/office/thememl/2012/main" name="Office Theme" id="{62F939B6-93AF-4DB8-9C6B-D6C7DFDC589F}" vid="{4A3C46E8-61CC-4603-A589-7422A47A8E4A}"/>
+    </a:ext>
+  </a:extLst>
+</a:theme>
+</file>
+
 <file path=ppt/theme/themeOverride1.xml><?xml version="1.0" encoding="utf-8"?>
 <a:themeOverride xmlns:a="http://schemas.openxmlformats.org/drawingml/2006/main">
   <a:clrScheme name="Marquee">
@@ -4926,21 +6103,21 @@
 </file>
 
 <file path=customXml/item1.xml><?xml version="1.0" encoding="utf-8"?>
+<?mso-contentType ?>
+<FormTemplates xmlns="http://schemas.microsoft.com/sharepoint/v3/contenttype/forms">
+  <Display>DocumentLibraryForm</Display>
+  <Edit>DocumentLibraryForm</Edit>
+  <New>DocumentLibraryForm</New>
+</FormTemplates>
+</file>
+
+<file path=customXml/item2.xml><?xml version="1.0" encoding="utf-8"?>
 <p:properties xmlns:p="http://schemas.microsoft.com/office/2006/metadata/properties" xmlns:xsi="http://www.w3.org/2001/XMLSchema-instance" xmlns:pc="http://schemas.microsoft.com/office/infopath/2007/PartnerControls">
   <documentManagement>
     <Status xmlns="71af3243-3dd4-4a8d-8c0d-dd76da1f02a5">Not started</Status>
     <MediaServiceKeyPoints xmlns="71af3243-3dd4-4a8d-8c0d-dd76da1f02a5" xsi:nil="true"/>
   </documentManagement>
 </p:properties>
-</file>
-
-<file path=customXml/item2.xml><?xml version="1.0" encoding="utf-8"?>
-<?mso-contentType ?>
-<FormTemplates xmlns="http://schemas.microsoft.com/sharepoint/v3/contenttype/forms">
-  <Display>DocumentLibraryForm</Display>
-  <Edit>DocumentLibraryForm</Edit>
-  <New>DocumentLibraryForm</New>
-</FormTemplates>
 </file>
 
 <file path=customXml/item3.xml><?xml version="1.0" encoding="utf-8"?>
@@ -5165,19 +6342,19 @@
 </file>
 
 <file path=customXml/itemProps1.xml><?xml version="1.0" encoding="utf-8"?>
+<ds:datastoreItem xmlns:ds="http://schemas.openxmlformats.org/officeDocument/2006/customXml" ds:itemID="{AE2713E1-6312-427E-BFCB-C5A5DA301373}">
+  <ds:schemaRefs>
+    <ds:schemaRef ds:uri="http://schemas.microsoft.com/sharepoint/v3/contenttype/forms"/>
+  </ds:schemaRefs>
+</ds:datastoreItem>
+</file>
+
+<file path=customXml/itemProps2.xml><?xml version="1.0" encoding="utf-8"?>
 <ds:datastoreItem xmlns:ds="http://schemas.openxmlformats.org/officeDocument/2006/customXml" ds:itemID="{52F3B215-496E-4790-A364-7C1C46DEC771}">
   <ds:schemaRefs>
     <ds:schemaRef ds:uri="http://schemas.microsoft.com/office/2006/metadata/properties"/>
     <ds:schemaRef ds:uri="http://schemas.microsoft.com/office/infopath/2007/PartnerControls"/>
     <ds:schemaRef ds:uri="71af3243-3dd4-4a8d-8c0d-dd76da1f02a5"/>
-  </ds:schemaRefs>
-</ds:datastoreItem>
-</file>
-
-<file path=customXml/itemProps2.xml><?xml version="1.0" encoding="utf-8"?>
-<ds:datastoreItem xmlns:ds="http://schemas.openxmlformats.org/officeDocument/2006/customXml" ds:itemID="{AE2713E1-6312-427E-BFCB-C5A5DA301373}">
-  <ds:schemaRefs>
-    <ds:schemaRef ds:uri="http://schemas.microsoft.com/sharepoint/v3/contenttype/forms"/>
   </ds:schemaRefs>
 </ds:datastoreItem>
 </file>

</xml_diff>